<commit_message>
added schema in archive
</commit_message>
<xml_diff>
--- a/archive/diagrams/db schema.pptx
+++ b/archive/diagrams/db schema.pptx
@@ -254,7 +254,7 @@
           <a:p>
             <a:fld id="{D946B7F6-C98B-4698-A625-7AB1640FF3BC}" type="datetimeFigureOut">
               <a:rPr lang="en-US" smtClean="0"/>
-              <a:t>5/22/2016</a:t>
+              <a:t>6/1/2016</a:t>
             </a:fld>
             <a:endParaRPr lang="en-US"/>
           </a:p>
@@ -424,7 +424,7 @@
           <a:p>
             <a:fld id="{D946B7F6-C98B-4698-A625-7AB1640FF3BC}" type="datetimeFigureOut">
               <a:rPr lang="en-US" smtClean="0"/>
-              <a:t>5/22/2016</a:t>
+              <a:t>6/1/2016</a:t>
             </a:fld>
             <a:endParaRPr lang="en-US"/>
           </a:p>
@@ -604,7 +604,7 @@
           <a:p>
             <a:fld id="{D946B7F6-C98B-4698-A625-7AB1640FF3BC}" type="datetimeFigureOut">
               <a:rPr lang="en-US" smtClean="0"/>
-              <a:t>5/22/2016</a:t>
+              <a:t>6/1/2016</a:t>
             </a:fld>
             <a:endParaRPr lang="en-US"/>
           </a:p>
@@ -774,7 +774,7 @@
           <a:p>
             <a:fld id="{D946B7F6-C98B-4698-A625-7AB1640FF3BC}" type="datetimeFigureOut">
               <a:rPr lang="en-US" smtClean="0"/>
-              <a:t>5/22/2016</a:t>
+              <a:t>6/1/2016</a:t>
             </a:fld>
             <a:endParaRPr lang="en-US"/>
           </a:p>
@@ -1020,7 +1020,7 @@
           <a:p>
             <a:fld id="{D946B7F6-C98B-4698-A625-7AB1640FF3BC}" type="datetimeFigureOut">
               <a:rPr lang="en-US" smtClean="0"/>
-              <a:t>5/22/2016</a:t>
+              <a:t>6/1/2016</a:t>
             </a:fld>
             <a:endParaRPr lang="en-US"/>
           </a:p>
@@ -1252,7 +1252,7 @@
           <a:p>
             <a:fld id="{D946B7F6-C98B-4698-A625-7AB1640FF3BC}" type="datetimeFigureOut">
               <a:rPr lang="en-US" smtClean="0"/>
-              <a:t>5/22/2016</a:t>
+              <a:t>6/1/2016</a:t>
             </a:fld>
             <a:endParaRPr lang="en-US"/>
           </a:p>
@@ -1619,7 +1619,7 @@
           <a:p>
             <a:fld id="{D946B7F6-C98B-4698-A625-7AB1640FF3BC}" type="datetimeFigureOut">
               <a:rPr lang="en-US" smtClean="0"/>
-              <a:t>5/22/2016</a:t>
+              <a:t>6/1/2016</a:t>
             </a:fld>
             <a:endParaRPr lang="en-US"/>
           </a:p>
@@ -1737,7 +1737,7 @@
           <a:p>
             <a:fld id="{D946B7F6-C98B-4698-A625-7AB1640FF3BC}" type="datetimeFigureOut">
               <a:rPr lang="en-US" smtClean="0"/>
-              <a:t>5/22/2016</a:t>
+              <a:t>6/1/2016</a:t>
             </a:fld>
             <a:endParaRPr lang="en-US"/>
           </a:p>
@@ -1832,7 +1832,7 @@
           <a:p>
             <a:fld id="{D946B7F6-C98B-4698-A625-7AB1640FF3BC}" type="datetimeFigureOut">
               <a:rPr lang="en-US" smtClean="0"/>
-              <a:t>5/22/2016</a:t>
+              <a:t>6/1/2016</a:t>
             </a:fld>
             <a:endParaRPr lang="en-US"/>
           </a:p>
@@ -2109,7 +2109,7 @@
           <a:p>
             <a:fld id="{D946B7F6-C98B-4698-A625-7AB1640FF3BC}" type="datetimeFigureOut">
               <a:rPr lang="en-US" smtClean="0"/>
-              <a:t>5/22/2016</a:t>
+              <a:t>6/1/2016</a:t>
             </a:fld>
             <a:endParaRPr lang="en-US"/>
           </a:p>
@@ -2362,7 +2362,7 @@
           <a:p>
             <a:fld id="{D946B7F6-C98B-4698-A625-7AB1640FF3BC}" type="datetimeFigureOut">
               <a:rPr lang="en-US" smtClean="0"/>
-              <a:t>5/22/2016</a:t>
+              <a:t>6/1/2016</a:t>
             </a:fld>
             <a:endParaRPr lang="en-US"/>
           </a:p>
@@ -2575,7 +2575,7 @@
           <a:p>
             <a:fld id="{D946B7F6-C98B-4698-A625-7AB1640FF3BC}" type="datetimeFigureOut">
               <a:rPr lang="en-US" smtClean="0"/>
-              <a:t>5/22/2016</a:t>
+              <a:t>6/1/2016</a:t>
             </a:fld>
             <a:endParaRPr lang="en-US"/>
           </a:p>
@@ -2992,8 +2992,8 @@
         </p:nvSpPr>
         <p:spPr>
           <a:xfrm>
-            <a:off x="1146220" y="850006"/>
-            <a:ext cx="3618963" cy="856915"/>
+            <a:off x="9326" y="314945"/>
+            <a:ext cx="3618963" cy="1164942"/>
           </a:xfrm>
         </p:spPr>
         <p:txBody>
@@ -3003,8 +3003,41 @@
           <a:lstStyle/>
           <a:p>
             <a:r>
+              <a:rPr lang="en-US" sz="4000" dirty="0"/>
+              <a:t/>
+            </a:r>
+            <a:br>
+              <a:rPr lang="en-US" sz="4000" dirty="0"/>
+            </a:br>
+            <a:r>
+              <a:rPr lang="en-US" sz="1800" i="1" u="sng" dirty="0" smtClean="0">
+                <a:solidFill>
+                  <a:schemeClr val="accent3"/>
+                </a:solidFill>
+              </a:rPr>
+              <a:t>table</a:t>
+            </a:r>
+            <a:r>
+              <a:rPr lang="en-US" sz="4000" dirty="0" smtClean="0"/>
+              <a:t/>
+            </a:r>
+            <a:br>
+              <a:rPr lang="en-US" sz="4000" dirty="0" smtClean="0"/>
+            </a:br>
+            <a:r>
               <a:rPr lang="en-US" sz="4000" dirty="0" smtClean="0"/>
               <a:t>Entity</a:t>
+            </a:r>
+            <a:br>
+              <a:rPr lang="en-US" sz="4000" dirty="0" smtClean="0"/>
+            </a:br>
+            <a:r>
+              <a:rPr lang="en-US" sz="1800" i="1" u="sng" dirty="0" smtClean="0">
+                <a:solidFill>
+                  <a:schemeClr val="accent3"/>
+                </a:solidFill>
+              </a:rPr>
+              <a:t>columns</a:t>
             </a:r>
             <a:r>
               <a:rPr lang="en-US" sz="2400" dirty="0" smtClean="0"/>
@@ -3014,14 +3047,22 @@
               <a:rPr lang="en-US" sz="2400" dirty="0" smtClean="0"/>
             </a:br>
             <a:r>
-              <a:rPr lang="en-US" sz="2400" i="1" dirty="0" smtClean="0"/>
-              <a:t>id, level, name, </a:t>
-            </a:r>
-            <a:r>
-              <a:rPr lang="en-US" sz="2400" i="1" dirty="0" err="1" smtClean="0"/>
+              <a:rPr lang="en-US" sz="2400" dirty="0" smtClean="0">
+                <a:solidFill>
+                  <a:schemeClr val="accent2"/>
+                </a:solidFill>
+              </a:rPr>
+              <a:t>id</a:t>
+            </a:r>
+            <a:r>
+              <a:rPr lang="en-US" sz="2400" dirty="0" smtClean="0"/>
+              <a:t>, level, name, </a:t>
+            </a:r>
+            <a:r>
+              <a:rPr lang="en-US" sz="2400" dirty="0" err="1" smtClean="0"/>
               <a:t>iso_code</a:t>
             </a:r>
-            <a:endParaRPr lang="en-US" sz="4000" i="1" dirty="0"/>
+            <a:endParaRPr lang="en-US" sz="4000" dirty="0"/>
           </a:p>
         </p:txBody>
       </p:sp>
@@ -3035,16 +3076,16 @@
         </p:nvSpPr>
         <p:spPr>
           <a:xfrm>
-            <a:off x="4069724" y="3194176"/>
-            <a:ext cx="3322749" cy="814589"/>
+            <a:off x="2671501" y="2345790"/>
+            <a:ext cx="5022761" cy="2060404"/>
           </a:xfrm>
           <a:prstGeom prst="rect">
             <a:avLst/>
           </a:prstGeom>
         </p:spPr>
         <p:txBody>
-          <a:bodyPr vert="horz" lIns="91440" tIns="45720" rIns="91440" bIns="45720" rtlCol="0">
-            <a:normAutofit fontScale="92500" lnSpcReduction="20000"/>
+          <a:bodyPr vert="horz" lIns="91440" tIns="45720" rIns="91440" bIns="45720" rtlCol="0" anchor="t">
+            <a:normAutofit/>
           </a:bodyPr>
           <a:lstStyle>
             <a:lvl1pPr marL="0" indent="0" algn="ctr" defTabSz="914400" rtl="0" eaLnBrk="1" latinLnBrk="0" hangingPunct="1">
@@ -3212,8 +3253,34 @@
           </a:lstStyle>
           <a:p>
             <a:r>
+              <a:rPr lang="en-US" sz="1800" i="1" u="sng" dirty="0">
+                <a:solidFill>
+                  <a:schemeClr val="accent3"/>
+                </a:solidFill>
+              </a:rPr>
+              <a:t>table</a:t>
+            </a:r>
+            <a:r>
+              <a:rPr lang="en-US" sz="2800" dirty="0" smtClean="0"/>
+              <a:t/>
+            </a:r>
+            <a:br>
+              <a:rPr lang="en-US" sz="2800" dirty="0" smtClean="0"/>
+            </a:br>
+            <a:r>
               <a:rPr lang="en-US" sz="2800" dirty="0" err="1" smtClean="0"/>
               <a:t>Literal_indicator_data</a:t>
+            </a:r>
+            <a:endParaRPr lang="en-US" sz="2800" dirty="0" smtClean="0"/>
+          </a:p>
+          <a:p>
+            <a:r>
+              <a:rPr lang="en-US" sz="1800" i="1" u="sng" dirty="0">
+                <a:solidFill>
+                  <a:schemeClr val="accent3"/>
+                </a:solidFill>
+              </a:rPr>
+              <a:t>columns</a:t>
             </a:r>
             <a:r>
               <a:rPr lang="en-US" dirty="0" smtClean="0"/>
@@ -3223,7 +3290,15 @@
               <a:rPr lang="en-US" dirty="0" smtClean="0"/>
             </a:br>
             <a:r>
-              <a:rPr lang="en-US" sz="1800" i="1" dirty="0" err="1" smtClean="0"/>
+              <a:rPr lang="en-US" sz="1800" dirty="0" smtClean="0"/>
+              <a:t>id, </a:t>
+            </a:r>
+            <a:r>
+              <a:rPr lang="en-US" sz="1800" i="1" dirty="0" err="1" smtClean="0">
+                <a:solidFill>
+                  <a:schemeClr val="accent2"/>
+                </a:solidFill>
+              </a:rPr>
               <a:t>ent_id</a:t>
             </a:r>
             <a:r>
@@ -3236,10 +3311,14 @@
             </a:r>
             <a:r>
               <a:rPr lang="en-US" sz="1800" i="1" dirty="0" smtClean="0"/>
-              <a:t>**, </a:t>
-            </a:r>
-            <a:r>
-              <a:rPr lang="en-US" sz="1800" i="1" dirty="0" err="1" smtClean="0"/>
+              <a:t>, </a:t>
+            </a:r>
+            <a:r>
+              <a:rPr lang="en-US" sz="1800" i="1" dirty="0" err="1" smtClean="0">
+                <a:solidFill>
+                  <a:schemeClr val="accent1"/>
+                </a:solidFill>
+              </a:rPr>
               <a:t>meta_id</a:t>
             </a:r>
             <a:r>
@@ -3249,98 +3328,6 @@
           </a:p>
           <a:p>
             <a:endParaRPr lang="en-US" i="1" dirty="0"/>
-          </a:p>
-        </p:txBody>
-      </p:sp>
-      <p:sp>
-        <p:nvSpPr>
-          <p:cNvPr id="19" name="TextBox 18"/>
-          <p:cNvSpPr txBox="1"/>
-          <p:nvPr/>
-        </p:nvSpPr>
-        <p:spPr>
-          <a:xfrm>
-            <a:off x="1225120" y="1850383"/>
-            <a:ext cx="3361386" cy="1200329"/>
-          </a:xfrm>
-          <a:prstGeom prst="rect">
-            <a:avLst/>
-          </a:prstGeom>
-          <a:noFill/>
-        </p:spPr>
-        <p:txBody>
-          <a:bodyPr wrap="square" rtlCol="0">
-            <a:spAutoFit/>
-          </a:bodyPr>
-          <a:lstStyle/>
-          <a:p>
-            <a:r>
-              <a:rPr lang="en-US" b="1" dirty="0" smtClean="0">
-                <a:solidFill>
-                  <a:srgbClr val="92D050"/>
-                </a:solidFill>
-              </a:rPr>
-              <a:t>1 to m relation</a:t>
-            </a:r>
-            <a:r>
-              <a:rPr lang="en-US" dirty="0" smtClean="0">
-                <a:solidFill>
-                  <a:srgbClr val="92D050"/>
-                </a:solidFill>
-              </a:rPr>
-              <a:t/>
-            </a:r>
-            <a:br>
-              <a:rPr lang="en-US" dirty="0" smtClean="0">
-                <a:solidFill>
-                  <a:srgbClr val="92D050"/>
-                </a:solidFill>
-              </a:rPr>
-            </a:br>
-            <a:r>
-              <a:rPr lang="en-US" dirty="0" smtClean="0">
-                <a:solidFill>
-                  <a:srgbClr val="92D050"/>
-                </a:solidFill>
-              </a:rPr>
-              <a:t>Select * from point where </a:t>
-            </a:r>
-            <a:r>
-              <a:rPr lang="en-US" dirty="0" err="1" smtClean="0">
-                <a:solidFill>
-                  <a:srgbClr val="92D050"/>
-                </a:solidFill>
-              </a:rPr>
-              <a:t>entid</a:t>
-            </a:r>
-            <a:r>
-              <a:rPr lang="en-US" dirty="0" smtClean="0">
-                <a:solidFill>
-                  <a:srgbClr val="92D050"/>
-                </a:solidFill>
-              </a:rPr>
-              <a:t>=id and year=year</a:t>
-            </a:r>
-            <a:br>
-              <a:rPr lang="en-US" dirty="0" smtClean="0">
-                <a:solidFill>
-                  <a:srgbClr val="92D050"/>
-                </a:solidFill>
-              </a:rPr>
-            </a:br>
-            <a:r>
-              <a:rPr lang="en-US" dirty="0" smtClean="0">
-                <a:solidFill>
-                  <a:srgbClr val="92D050"/>
-                </a:solidFill>
-              </a:rPr>
-              <a:t> </a:t>
-            </a:r>
-            <a:endParaRPr lang="en-US" dirty="0">
-              <a:solidFill>
-                <a:srgbClr val="92D050"/>
-              </a:solidFill>
-            </a:endParaRPr>
           </a:p>
         </p:txBody>
       </p:sp>
@@ -3352,8 +3339,8 @@
         </p:nvCxnSpPr>
         <p:spPr>
           <a:xfrm>
-            <a:off x="4069725" y="1706921"/>
-            <a:ext cx="978794" cy="1487255"/>
+            <a:off x="2527144" y="1479887"/>
+            <a:ext cx="1777285" cy="1063161"/>
           </a:xfrm>
           <a:prstGeom prst="line">
             <a:avLst/>
@@ -3382,8 +3369,107 @@
         </p:nvSpPr>
         <p:spPr>
           <a:xfrm>
-            <a:off x="433539" y="4613445"/>
-            <a:ext cx="10671704" cy="1200329"/>
+            <a:off x="49376" y="1487737"/>
+            <a:ext cx="2245948" cy="2031325"/>
+          </a:xfrm>
+          <a:prstGeom prst="rect">
+            <a:avLst/>
+          </a:prstGeom>
+        </p:spPr>
+        <p:style>
+          <a:lnRef idx="2">
+            <a:schemeClr val="dk1"/>
+          </a:lnRef>
+          <a:fillRef idx="1">
+            <a:schemeClr val="lt1"/>
+          </a:fillRef>
+          <a:effectRef idx="0">
+            <a:schemeClr val="dk1"/>
+          </a:effectRef>
+          <a:fontRef idx="minor">
+            <a:schemeClr val="dk1"/>
+          </a:fontRef>
+        </p:style>
+        <p:txBody>
+          <a:bodyPr wrap="square" rtlCol="0">
+            <a:spAutoFit/>
+          </a:bodyPr>
+          <a:lstStyle/>
+          <a:p>
+            <a:r>
+              <a:rPr lang="en-US" sz="1400" dirty="0" smtClean="0"/>
+              <a:t>level </a:t>
+            </a:r>
+            <a:r>
+              <a:rPr lang="en-US" sz="1400" i="1" dirty="0" smtClean="0"/>
+              <a:t>may be Country, State, Province, etc.</a:t>
+            </a:r>
+            <a:r>
+              <a:rPr lang="en-US" sz="1400" dirty="0" smtClean="0"/>
+              <a:t/>
+            </a:r>
+            <a:br>
+              <a:rPr lang="en-US" sz="1400" dirty="0" smtClean="0"/>
+            </a:br>
+            <a:endParaRPr lang="en-US" sz="1400" dirty="0" smtClean="0"/>
+          </a:p>
+          <a:p>
+            <a:r>
+              <a:rPr lang="en-US" sz="1400" dirty="0" smtClean="0"/>
+              <a:t>name </a:t>
+            </a:r>
+            <a:r>
+              <a:rPr lang="en-US" sz="1400" i="1" dirty="0" smtClean="0"/>
+              <a:t>is the official name from the data provider</a:t>
+            </a:r>
+            <a:r>
+              <a:rPr lang="en-US" sz="1400" dirty="0" smtClean="0"/>
+              <a:t/>
+            </a:r>
+            <a:br>
+              <a:rPr lang="en-US" sz="1400" dirty="0" smtClean="0"/>
+            </a:br>
+            <a:endParaRPr lang="en-US" sz="1400" dirty="0" smtClean="0"/>
+          </a:p>
+          <a:p>
+            <a:r>
+              <a:rPr lang="en-US" sz="1400" dirty="0" err="1" smtClean="0"/>
+              <a:t>iso_code</a:t>
+            </a:r>
+            <a:r>
+              <a:rPr lang="en-US" sz="1400" dirty="0" smtClean="0"/>
+              <a:t> </a:t>
+            </a:r>
+            <a:r>
+              <a:rPr lang="en-US" sz="1400" i="1" dirty="0" smtClean="0"/>
+              <a:t>is a country’s </a:t>
+            </a:r>
+            <a:r>
+              <a:rPr lang="en-US" sz="1400" i="1" dirty="0" err="1" smtClean="0"/>
+              <a:t>iso</a:t>
+            </a:r>
+            <a:r>
+              <a:rPr lang="en-US" sz="1400" i="1" dirty="0"/>
+              <a:t> </a:t>
+            </a:r>
+            <a:r>
+              <a:rPr lang="en-US" sz="1400" i="1" dirty="0" smtClean="0"/>
+              <a:t>code (for other entities, this will be null for now)</a:t>
+            </a:r>
+            <a:endParaRPr lang="en-US" i="1" dirty="0" smtClean="0"/>
+          </a:p>
+        </p:txBody>
+      </p:sp>
+      <p:sp>
+        <p:nvSpPr>
+          <p:cNvPr id="28" name="TextBox 27"/>
+          <p:cNvSpPr txBox="1"/>
+          <p:nvPr/>
+        </p:nvSpPr>
+        <p:spPr>
+          <a:xfrm>
+            <a:off x="5790529" y="-509"/>
+            <a:ext cx="5208092" cy="1415772"/>
           </a:xfrm>
           <a:prstGeom prst="rect">
             <a:avLst/>
@@ -3396,84 +3482,62 @@
           </a:bodyPr>
           <a:lstStyle/>
           <a:p>
+            <a:pPr algn="ctr"/>
+            <a:r>
+              <a:rPr lang="en-US" i="1" u="sng" dirty="0">
+                <a:solidFill>
+                  <a:schemeClr val="accent3"/>
+                </a:solidFill>
+                <a:latin typeface="+mj-lt"/>
+              </a:rPr>
+              <a:t>table</a:t>
+            </a:r>
+            <a:endParaRPr lang="en-US" dirty="0" smtClean="0">
+              <a:solidFill>
+                <a:schemeClr val="accent3"/>
+              </a:solidFill>
+              <a:latin typeface="+mj-lt"/>
+            </a:endParaRPr>
+          </a:p>
+          <a:p>
+            <a:pPr algn="ctr"/>
+            <a:r>
+              <a:rPr lang="en-US" sz="3200" dirty="0" err="1" smtClean="0"/>
+              <a:t>Meta_indicator_data</a:t>
+            </a:r>
+            <a:r>
+              <a:rPr lang="en-US" sz="3200" dirty="0" smtClean="0"/>
+              <a:t/>
+            </a:r>
+            <a:br>
+              <a:rPr lang="en-US" sz="3200" dirty="0" smtClean="0"/>
+            </a:br>
+            <a:r>
+              <a:rPr lang="en-US" i="1" u="sng" dirty="0" smtClean="0">
+                <a:solidFill>
+                  <a:schemeClr val="accent3"/>
+                </a:solidFill>
+              </a:rPr>
+              <a:t>columns</a:t>
+            </a:r>
             <a:r>
               <a:rPr lang="en-US" dirty="0" smtClean="0"/>
-              <a:t>Strengths – a simple to understand </a:t>
-            </a:r>
-            <a:r>
-              <a:rPr lang="en-US" dirty="0" err="1" smtClean="0"/>
-              <a:t>db</a:t>
-            </a:r>
-            <a:r>
-              <a:rPr lang="en-US" dirty="0" smtClean="0"/>
-              <a:t> minimizing redundancy.</a:t>
+              <a:t/>
             </a:r>
             <a:br>
               <a:rPr lang="en-US" dirty="0" smtClean="0"/>
             </a:br>
             <a:r>
-              <a:rPr lang="en-US" dirty="0"/>
-              <a:t/>
-            </a:r>
-            <a:br>
-              <a:rPr lang="en-US" dirty="0"/>
-            </a:br>
-            <a:r>
-              <a:rPr lang="en-US" i="1" dirty="0" err="1" smtClean="0"/>
-              <a:t>display_name</a:t>
+              <a:rPr lang="en-US" i="1" dirty="0" smtClean="0">
+                <a:solidFill>
+                  <a:schemeClr val="accent1"/>
+                </a:solidFill>
+              </a:rPr>
+              <a:t>id</a:t>
             </a:r>
             <a:r>
               <a:rPr lang="en-US" i="1" dirty="0" smtClean="0"/>
-              <a:t> is a composite string of indicator name and source name (both may be shortened for easy display). </a:t>
-            </a:r>
-            <a:r>
-              <a:rPr lang="en-US" dirty="0" smtClean="0"/>
-              <a:t/>
-            </a:r>
-            <a:br>
-              <a:rPr lang="en-US" dirty="0" smtClean="0"/>
-            </a:br>
-            <a:endParaRPr lang="en-US" dirty="0"/>
-          </a:p>
-        </p:txBody>
-      </p:sp>
-      <p:sp>
-        <p:nvSpPr>
-          <p:cNvPr id="28" name="TextBox 27"/>
-          <p:cNvSpPr txBox="1"/>
-          <p:nvPr/>
-        </p:nvSpPr>
-        <p:spPr>
-          <a:xfrm>
-            <a:off x="6251465" y="708338"/>
-            <a:ext cx="5208092" cy="861774"/>
-          </a:xfrm>
-          <a:prstGeom prst="rect">
-            <a:avLst/>
-          </a:prstGeom>
-          <a:noFill/>
-        </p:spPr>
-        <p:txBody>
-          <a:bodyPr wrap="none" rtlCol="0">
-            <a:spAutoFit/>
-          </a:bodyPr>
-          <a:lstStyle/>
-          <a:p>
-            <a:pPr algn="ctr"/>
-            <a:r>
-              <a:rPr lang="en-US" sz="3200" dirty="0" err="1" smtClean="0"/>
-              <a:t>Meta_indicator_data</a:t>
-            </a:r>
-            <a:r>
-              <a:rPr lang="en-US" dirty="0" smtClean="0"/>
-              <a:t/>
-            </a:r>
-            <a:br>
-              <a:rPr lang="en-US" dirty="0" smtClean="0"/>
-            </a:br>
-            <a:r>
-              <a:rPr lang="en-US" i="1" dirty="0" smtClean="0"/>
-              <a:t>id, </a:t>
+              <a:t>, </a:t>
             </a:r>
             <a:r>
               <a:rPr lang="en-US" i="1" dirty="0" err="1" smtClean="0"/>
@@ -3493,11 +3557,7 @@
             </a:r>
             <a:r>
               <a:rPr lang="en-US" i="1" dirty="0" err="1" smtClean="0"/>
-              <a:t>P_</a:t>
-            </a:r>
-            <a:r>
-              <a:rPr lang="en-US" i="1" dirty="0" err="1" smtClean="0"/>
-              <a:t>description</a:t>
+              <a:t>P_description</a:t>
             </a:r>
             <a:endParaRPr lang="en-US" dirty="0"/>
           </a:p>
@@ -3511,8 +3571,8 @@
         </p:nvCxnSpPr>
         <p:spPr>
           <a:xfrm flipH="1">
-            <a:off x="6805423" y="1638516"/>
-            <a:ext cx="1076448" cy="1555660"/>
+            <a:off x="6061334" y="1377405"/>
+            <a:ext cx="1297330" cy="1165643"/>
           </a:xfrm>
           <a:prstGeom prst="line">
             <a:avLst/>
@@ -3535,14 +3595,14 @@
       </p:cxnSp>
       <p:sp>
         <p:nvSpPr>
-          <p:cNvPr id="32" name="TextBox 31"/>
+          <p:cNvPr id="5" name="TextBox 4"/>
           <p:cNvSpPr txBox="1"/>
           <p:nvPr/>
         </p:nvSpPr>
         <p:spPr>
           <a:xfrm>
-            <a:off x="7881871" y="1841678"/>
-            <a:ext cx="3425779" cy="923330"/>
+            <a:off x="9326" y="5934670"/>
+            <a:ext cx="11061426" cy="923330"/>
           </a:xfrm>
           <a:prstGeom prst="rect">
             <a:avLst/>
@@ -3550,132 +3610,218 @@
           <a:noFill/>
         </p:spPr>
         <p:txBody>
-          <a:bodyPr wrap="square" rtlCol="0">
+          <a:bodyPr wrap="none" rtlCol="0">
             <a:spAutoFit/>
           </a:bodyPr>
           <a:lstStyle/>
           <a:p>
-            <a:pPr algn="r"/>
-            <a:r>
-              <a:rPr lang="en-US" b="1" dirty="0" smtClean="0">
-                <a:solidFill>
-                  <a:srgbClr val="92D050"/>
-                </a:solidFill>
-              </a:rPr>
-              <a:t>1 to m relation</a:t>
-            </a:r>
-            <a:r>
-              <a:rPr lang="en-US" dirty="0" smtClean="0">
-                <a:solidFill>
-                  <a:srgbClr val="92D050"/>
-                </a:solidFill>
-              </a:rPr>
-              <a:t/>
+            <a:r>
+              <a:rPr lang="en-US" dirty="0"/>
+              <a:t>Strengths – a simple to understand </a:t>
+            </a:r>
+            <a:r>
+              <a:rPr lang="en-US" dirty="0" err="1"/>
+              <a:t>db</a:t>
+            </a:r>
+            <a:r>
+              <a:rPr lang="en-US" dirty="0"/>
+              <a:t> minimizing redundancy.</a:t>
             </a:r>
             <a:br>
-              <a:rPr lang="en-US" dirty="0" smtClean="0">
-                <a:solidFill>
-                  <a:srgbClr val="92D050"/>
-                </a:solidFill>
-              </a:rPr>
+              <a:rPr lang="en-US" dirty="0"/>
             </a:br>
             <a:r>
-              <a:rPr lang="en-US" dirty="0" smtClean="0">
-                <a:solidFill>
-                  <a:srgbClr val="92D050"/>
-                </a:solidFill>
-              </a:rPr>
-              <a:t>Select name from point where </a:t>
-            </a:r>
-            <a:r>
-              <a:rPr lang="en-US" dirty="0" err="1" smtClean="0">
-                <a:solidFill>
-                  <a:srgbClr val="92D050"/>
-                </a:solidFill>
-              </a:rPr>
-              <a:t>indid</a:t>
-            </a:r>
-            <a:r>
-              <a:rPr lang="en-US" dirty="0" smtClean="0">
-                <a:solidFill>
-                  <a:srgbClr val="92D050"/>
-                </a:solidFill>
-              </a:rPr>
-              <a:t>=</a:t>
-            </a:r>
-            <a:r>
-              <a:rPr lang="en-US" dirty="0" err="1" smtClean="0">
-                <a:solidFill>
-                  <a:srgbClr val="92D050"/>
-                </a:solidFill>
-              </a:rPr>
-              <a:t>indid</a:t>
-            </a:r>
-            <a:endParaRPr lang="en-US" dirty="0" smtClean="0">
-              <a:solidFill>
-                <a:srgbClr val="92D050"/>
-              </a:solidFill>
-            </a:endParaRPr>
-          </a:p>
-        </p:txBody>
-      </p:sp>
-      <p:sp>
-        <p:nvSpPr>
-          <p:cNvPr id="36" name="Rectangle 35"/>
-          <p:cNvSpPr/>
+              <a:rPr lang="en-US" dirty="0"/>
+              <a:t>Weaknesses – parsing from APIs will require serious coding, dealing with </a:t>
+            </a:r>
+            <a:r>
+              <a:rPr lang="en-US" dirty="0" err="1"/>
+              <a:t>Meta_indicator_data</a:t>
+            </a:r>
+            <a:r>
+              <a:rPr lang="en-US" dirty="0"/>
+              <a:t> will be trial and error.</a:t>
+            </a:r>
+            <a:br>
+              <a:rPr lang="en-US" dirty="0"/>
+            </a:br>
+            <a:endParaRPr lang="en-US" dirty="0"/>
+          </a:p>
+        </p:txBody>
+      </p:sp>
+      <p:sp>
+        <p:nvSpPr>
+          <p:cNvPr id="7" name="TextBox 6"/>
+          <p:cNvSpPr txBox="1"/>
           <p:nvPr/>
         </p:nvSpPr>
         <p:spPr>
           <a:xfrm>
-            <a:off x="1056069" y="557245"/>
-            <a:ext cx="10686642" cy="3770055"/>
+            <a:off x="3007098" y="3724255"/>
+            <a:ext cx="4351566" cy="1384995"/>
           </a:xfrm>
           <a:prstGeom prst="rect">
             <a:avLst/>
           </a:prstGeom>
-          <a:noFill/>
         </p:spPr>
         <p:style>
           <a:lnRef idx="2">
-            <a:schemeClr val="accent1">
-              <a:shade val="50000"/>
-            </a:schemeClr>
+            <a:schemeClr val="dk1"/>
           </a:lnRef>
           <a:fillRef idx="1">
-            <a:schemeClr val="accent1"/>
+            <a:schemeClr val="lt1"/>
           </a:fillRef>
           <a:effectRef idx="0">
-            <a:schemeClr val="accent1"/>
+            <a:schemeClr val="dk1"/>
           </a:effectRef>
           <a:fontRef idx="minor">
-            <a:schemeClr val="lt1"/>
+            <a:schemeClr val="dk1"/>
           </a:fontRef>
         </p:style>
         <p:txBody>
-          <a:bodyPr rtlCol="0" anchor="ctr"/>
-          <a:lstStyle/>
-          <a:p>
-            <a:pPr algn="ctr"/>
-            <a:endParaRPr lang="en-US" dirty="0"/>
-          </a:p>
-        </p:txBody>
-      </p:sp>
-      <p:sp>
-        <p:nvSpPr>
-          <p:cNvPr id="37" name="TextBox 36"/>
+          <a:bodyPr wrap="square" rtlCol="0">
+            <a:spAutoFit/>
+          </a:bodyPr>
+          <a:lstStyle/>
+          <a:p>
+            <a:r>
+              <a:rPr lang="en-US" sz="1400" dirty="0" smtClean="0"/>
+              <a:t>year</a:t>
+            </a:r>
+            <a:r>
+              <a:rPr lang="en-US" sz="1400" i="1" dirty="0" smtClean="0"/>
+              <a:t> is </a:t>
+            </a:r>
+            <a:r>
+              <a:rPr lang="en-US" sz="1400" i="1" dirty="0"/>
+              <a:t>the year the data point was </a:t>
+            </a:r>
+            <a:r>
+              <a:rPr lang="en-US" sz="1400" i="1" dirty="0" smtClean="0"/>
+              <a:t>observed</a:t>
+            </a:r>
+          </a:p>
+          <a:p>
+            <a:r>
+              <a:rPr lang="en-US" sz="1400" i="1" dirty="0"/>
+              <a:t/>
+            </a:r>
+            <a:br>
+              <a:rPr lang="en-US" sz="1400" i="1" dirty="0"/>
+            </a:br>
+            <a:r>
+              <a:rPr lang="en-US" sz="1400" dirty="0"/>
+              <a:t>value</a:t>
+            </a:r>
+            <a:r>
+              <a:rPr lang="en-US" sz="1400" i="1" dirty="0"/>
+              <a:t> is the raw value stored as a string</a:t>
+            </a:r>
+            <a:br>
+              <a:rPr lang="en-US" sz="1400" i="1" dirty="0"/>
+            </a:br>
+            <a:endParaRPr lang="en-US" sz="1400" i="1" dirty="0" smtClean="0"/>
+          </a:p>
+          <a:p>
+            <a:r>
+              <a:rPr lang="en-US" sz="1400" dirty="0" err="1" smtClean="0"/>
+              <a:t>display_name</a:t>
+            </a:r>
+            <a:r>
+              <a:rPr lang="en-US" sz="1400" i="1" dirty="0" smtClean="0"/>
+              <a:t> </a:t>
+            </a:r>
+            <a:r>
+              <a:rPr lang="en-US" sz="1400" i="1" dirty="0"/>
+              <a:t>is a composite string of indicator name and source name (both may be shortened for easy display).</a:t>
+            </a:r>
+          </a:p>
+        </p:txBody>
+      </p:sp>
+      <p:sp>
+        <p:nvSpPr>
+          <p:cNvPr id="8" name="TextBox 7"/>
           <p:cNvSpPr txBox="1"/>
           <p:nvPr/>
         </p:nvSpPr>
         <p:spPr>
           <a:xfrm>
-            <a:off x="1225120" y="218941"/>
-            <a:ext cx="1118835" cy="646331"/>
+            <a:off x="1674644" y="5095138"/>
+            <a:ext cx="7016473" cy="369332"/>
           </a:xfrm>
           <a:prstGeom prst="rect">
             <a:avLst/>
           </a:prstGeom>
-          <a:noFill/>
         </p:spPr>
+        <p:style>
+          <a:lnRef idx="2">
+            <a:schemeClr val="dk1"/>
+          </a:lnRef>
+          <a:fillRef idx="1">
+            <a:schemeClr val="lt1"/>
+          </a:fillRef>
+          <a:effectRef idx="0">
+            <a:schemeClr val="dk1"/>
+          </a:effectRef>
+          <a:fontRef idx="minor">
+            <a:schemeClr val="dk1"/>
+          </a:fontRef>
+        </p:style>
+        <p:txBody>
+          <a:bodyPr wrap="none" rtlCol="0">
+            <a:spAutoFit/>
+          </a:bodyPr>
+          <a:lstStyle/>
+          <a:p>
+            <a:r>
+              <a:rPr lang="en-US" i="1" dirty="0"/>
+              <a:t>All id's are simple primary key ids that </a:t>
+            </a:r>
+            <a:r>
+              <a:rPr lang="en-US" i="1" dirty="0" smtClean="0"/>
+              <a:t>may also serve </a:t>
+            </a:r>
+            <a:r>
+              <a:rPr lang="en-US" i="1" dirty="0"/>
+              <a:t>also as foreign </a:t>
+            </a:r>
+            <a:r>
+              <a:rPr lang="en-US" i="1" dirty="0" smtClean="0"/>
+              <a:t>keys </a:t>
+            </a:r>
+            <a:endParaRPr lang="en-US" dirty="0"/>
+          </a:p>
+        </p:txBody>
+      </p:sp>
+      <p:sp>
+        <p:nvSpPr>
+          <p:cNvPr id="17" name="TextBox 16"/>
+          <p:cNvSpPr txBox="1"/>
+          <p:nvPr/>
+        </p:nvSpPr>
+        <p:spPr>
+          <a:xfrm>
+            <a:off x="7551849" y="1386044"/>
+            <a:ext cx="4351566" cy="3108543"/>
+          </a:xfrm>
+          <a:prstGeom prst="rect">
+            <a:avLst/>
+          </a:prstGeom>
+        </p:spPr>
+        <p:style>
+          <a:lnRef idx="2">
+            <a:schemeClr val="dk1"/>
+          </a:lnRef>
+          <a:fillRef idx="1">
+            <a:schemeClr val="lt1"/>
+          </a:fillRef>
+          <a:effectRef idx="0">
+            <a:schemeClr val="dk1"/>
+          </a:effectRef>
+          <a:fontRef idx="minor">
+            <a:schemeClr val="dk1"/>
+          </a:fontRef>
+        </p:style>
         <p:txBody>
           <a:bodyPr wrap="square" rtlCol="0">
             <a:spAutoFit/>
@@ -3683,12 +3829,119 @@
           <a:lstStyle/>
           <a:p>
             <a:r>
-              <a:rPr lang="en-US" dirty="0" smtClean="0"/>
-              <a:t>Core data</a:t>
-            </a:r>
-          </a:p>
-          <a:p>
-            <a:endParaRPr lang="en-US" dirty="0"/>
+              <a:rPr lang="en-US" sz="1400" dirty="0" err="1" smtClean="0"/>
+              <a:t>P_name</a:t>
+            </a:r>
+            <a:r>
+              <a:rPr lang="en-US" sz="1400" dirty="0" smtClean="0"/>
+              <a:t> </a:t>
+            </a:r>
+            <a:r>
+              <a:rPr lang="en-US" sz="1400" i="1" dirty="0" smtClean="0"/>
+              <a:t> is the name of the </a:t>
+            </a:r>
+            <a:r>
+              <a:rPr lang="en-US" sz="1400" i="1" dirty="0" err="1" smtClean="0"/>
+              <a:t>indiator</a:t>
+            </a:r>
+            <a:r>
+              <a:rPr lang="en-US" sz="1400" i="1" dirty="0" smtClean="0"/>
+              <a:t> taken straight from the data provider</a:t>
+            </a:r>
+          </a:p>
+          <a:p>
+            <a:r>
+              <a:rPr lang="en-US" sz="1400" i="1" dirty="0"/>
+              <a:t/>
+            </a:r>
+            <a:br>
+              <a:rPr lang="en-US" sz="1400" i="1" dirty="0"/>
+            </a:br>
+            <a:r>
+              <a:rPr lang="en-US" sz="1400" dirty="0" smtClean="0"/>
+              <a:t>family </a:t>
+            </a:r>
+            <a:r>
+              <a:rPr lang="en-US" sz="1400" i="1" dirty="0" smtClean="0"/>
+              <a:t>is a macro category used to retrieve data based on subject matter</a:t>
+            </a:r>
+            <a:r>
+              <a:rPr lang="en-US" sz="1400" i="1" dirty="0"/>
+              <a:t/>
+            </a:r>
+            <a:br>
+              <a:rPr lang="en-US" sz="1400" i="1" dirty="0"/>
+            </a:br>
+            <a:endParaRPr lang="en-US" sz="1400" i="1" dirty="0" smtClean="0"/>
+          </a:p>
+          <a:p>
+            <a:r>
+              <a:rPr lang="en-US" sz="1400" dirty="0" err="1" smtClean="0"/>
+              <a:t>Num</a:t>
+            </a:r>
+            <a:r>
+              <a:rPr lang="en-US" sz="1400" dirty="0" smtClean="0"/>
+              <a:t>-type</a:t>
+            </a:r>
+            <a:r>
+              <a:rPr lang="en-US" sz="1400" i="1" dirty="0" smtClean="0"/>
+              <a:t> represents decimal, percentage, </a:t>
+            </a:r>
+            <a:r>
+              <a:rPr lang="en-US" sz="1400" i="1" dirty="0" err="1" smtClean="0"/>
+              <a:t>interger</a:t>
+            </a:r>
+            <a:r>
+              <a:rPr lang="en-US" sz="1400" i="1" dirty="0" smtClean="0"/>
+              <a:t>, etc.</a:t>
+            </a:r>
+            <a:br>
+              <a:rPr lang="en-US" sz="1400" i="1" dirty="0" smtClean="0"/>
+            </a:br>
+            <a:r>
+              <a:rPr lang="en-US" sz="1400" dirty="0" smtClean="0"/>
+              <a:t/>
+            </a:r>
+            <a:br>
+              <a:rPr lang="en-US" sz="1400" dirty="0" smtClean="0"/>
+            </a:br>
+            <a:r>
+              <a:rPr lang="en-US" sz="1400" dirty="0" smtClean="0"/>
+              <a:t>Provider </a:t>
+            </a:r>
+            <a:r>
+              <a:rPr lang="en-US" sz="1400" i="1" dirty="0" smtClean="0"/>
+              <a:t>is the full name of the data provider</a:t>
+            </a:r>
+            <a:br>
+              <a:rPr lang="en-US" sz="1400" i="1" dirty="0" smtClean="0"/>
+            </a:br>
+            <a:r>
+              <a:rPr lang="en-US" sz="1400" i="1" dirty="0" smtClean="0"/>
+              <a:t/>
+            </a:r>
+            <a:br>
+              <a:rPr lang="en-US" sz="1400" i="1" dirty="0" smtClean="0"/>
+            </a:br>
+            <a:r>
+              <a:rPr lang="en-US" sz="1400" dirty="0" err="1" smtClean="0"/>
+              <a:t>p_description</a:t>
+            </a:r>
+            <a:r>
+              <a:rPr lang="en-US" sz="1400" dirty="0" smtClean="0"/>
+              <a:t> </a:t>
+            </a:r>
+            <a:r>
+              <a:rPr lang="en-US" sz="1400" i="1" dirty="0" smtClean="0"/>
+              <a:t>description of this indicator from the provider</a:t>
+            </a:r>
+            <a:br>
+              <a:rPr lang="en-US" sz="1400" i="1" dirty="0" smtClean="0"/>
+            </a:br>
+            <a:endParaRPr lang="en-US" sz="1400" i="1" dirty="0" smtClean="0"/>
+          </a:p>
+          <a:p>
+            <a:endParaRPr lang="en-US" sz="1400" i="1" dirty="0"/>
           </a:p>
         </p:txBody>
       </p:sp>

</xml_diff>